<commit_message>
Lighter color blue for cover
</commit_message>
<xml_diff>
--- a/StudentGuideModule2/132_front_pages/induction_setup.pptx
+++ b/StudentGuideModule2/132_front_pages/induction_setup.pptx
@@ -104,6 +104,22 @@
       </a:defRPr>
     </a:lvl9pPr>
   </p:defaultTextStyle>
+  <p:extLst>
+    <p:ext uri="{EFAFB233-063F-42B5-8137-9DF3F51BA10A}">
+      <p15:sldGuideLst xmlns:p15="http://schemas.microsoft.com/office/powerpoint/2012/main">
+        <p15:guide id="1" orient="horz" pos="2160">
+          <p15:clr>
+            <a:srgbClr val="A4A3A4"/>
+          </p15:clr>
+        </p15:guide>
+        <p15:guide id="2" pos="2880">
+          <p15:clr>
+            <a:srgbClr val="A4A3A4"/>
+          </p15:clr>
+        </p15:guide>
+      </p15:sldGuideLst>
+    </p:ext>
+  </p:extLst>
 </p:presentation>
 </file>
 
@@ -288,7 +304,7 @@
           <a:p>
             <a:fld id="{4AB23A2E-EF27-4F88-A230-C22FC5EE1674}" type="datetimeFigureOut">
               <a:rPr lang="en-US" smtClean="0"/>
-              <a:t>4/25/2016</a:t>
+              <a:t>5/26/2016</a:t>
             </a:fld>
             <a:endParaRPr lang="en-US"/>
           </a:p>
@@ -458,7 +474,7 @@
           <a:p>
             <a:fld id="{4AB23A2E-EF27-4F88-A230-C22FC5EE1674}" type="datetimeFigureOut">
               <a:rPr lang="en-US" smtClean="0"/>
-              <a:t>4/25/2016</a:t>
+              <a:t>5/26/2016</a:t>
             </a:fld>
             <a:endParaRPr lang="en-US"/>
           </a:p>
@@ -638,7 +654,7 @@
           <a:p>
             <a:fld id="{4AB23A2E-EF27-4F88-A230-C22FC5EE1674}" type="datetimeFigureOut">
               <a:rPr lang="en-US" smtClean="0"/>
-              <a:t>4/25/2016</a:t>
+              <a:t>5/26/2016</a:t>
             </a:fld>
             <a:endParaRPr lang="en-US"/>
           </a:p>
@@ -808,7 +824,7 @@
           <a:p>
             <a:fld id="{4AB23A2E-EF27-4F88-A230-C22FC5EE1674}" type="datetimeFigureOut">
               <a:rPr lang="en-US" smtClean="0"/>
-              <a:t>4/25/2016</a:t>
+              <a:t>5/26/2016</a:t>
             </a:fld>
             <a:endParaRPr lang="en-US"/>
           </a:p>
@@ -1054,7 +1070,7 @@
           <a:p>
             <a:fld id="{4AB23A2E-EF27-4F88-A230-C22FC5EE1674}" type="datetimeFigureOut">
               <a:rPr lang="en-US" smtClean="0"/>
-              <a:t>4/25/2016</a:t>
+              <a:t>5/26/2016</a:t>
             </a:fld>
             <a:endParaRPr lang="en-US"/>
           </a:p>
@@ -1342,7 +1358,7 @@
           <a:p>
             <a:fld id="{4AB23A2E-EF27-4F88-A230-C22FC5EE1674}" type="datetimeFigureOut">
               <a:rPr lang="en-US" smtClean="0"/>
-              <a:t>4/25/2016</a:t>
+              <a:t>5/26/2016</a:t>
             </a:fld>
             <a:endParaRPr lang="en-US"/>
           </a:p>
@@ -1764,7 +1780,7 @@
           <a:p>
             <a:fld id="{4AB23A2E-EF27-4F88-A230-C22FC5EE1674}" type="datetimeFigureOut">
               <a:rPr lang="en-US" smtClean="0"/>
-              <a:t>4/25/2016</a:t>
+              <a:t>5/26/2016</a:t>
             </a:fld>
             <a:endParaRPr lang="en-US"/>
           </a:p>
@@ -1882,7 +1898,7 @@
           <a:p>
             <a:fld id="{4AB23A2E-EF27-4F88-A230-C22FC5EE1674}" type="datetimeFigureOut">
               <a:rPr lang="en-US" smtClean="0"/>
-              <a:t>4/25/2016</a:t>
+              <a:t>5/26/2016</a:t>
             </a:fld>
             <a:endParaRPr lang="en-US"/>
           </a:p>
@@ -1977,7 +1993,7 @@
           <a:p>
             <a:fld id="{4AB23A2E-EF27-4F88-A230-C22FC5EE1674}" type="datetimeFigureOut">
               <a:rPr lang="en-US" smtClean="0"/>
-              <a:t>4/25/2016</a:t>
+              <a:t>5/26/2016</a:t>
             </a:fld>
             <a:endParaRPr lang="en-US"/>
           </a:p>
@@ -2254,7 +2270,7 @@
           <a:p>
             <a:fld id="{4AB23A2E-EF27-4F88-A230-C22FC5EE1674}" type="datetimeFigureOut">
               <a:rPr lang="en-US" smtClean="0"/>
-              <a:t>4/25/2016</a:t>
+              <a:t>5/26/2016</a:t>
             </a:fld>
             <a:endParaRPr lang="en-US"/>
           </a:p>
@@ -2507,7 +2523,7 @@
           <a:p>
             <a:fld id="{4AB23A2E-EF27-4F88-A230-C22FC5EE1674}" type="datetimeFigureOut">
               <a:rPr lang="en-US" smtClean="0"/>
-              <a:t>4/25/2016</a:t>
+              <a:t>5/26/2016</a:t>
             </a:fld>
             <a:endParaRPr lang="en-US"/>
           </a:p>
@@ -2720,7 +2736,7 @@
           <a:p>
             <a:fld id="{4AB23A2E-EF27-4F88-A230-C22FC5EE1674}" type="datetimeFigureOut">
               <a:rPr lang="en-US" smtClean="0"/>
-              <a:t>4/25/2016</a:t>
+              <a:t>5/26/2016</a:t>
             </a:fld>
             <a:endParaRPr lang="en-US"/>
           </a:p>
@@ -3110,7 +3126,7 @@
             <a:avLst/>
           </a:prstGeom>
           <a:solidFill>
-            <a:srgbClr val="0000A0"/>
+            <a:srgbClr val="0080FF"/>
           </a:solidFill>
           <a:ln>
             <a:noFill/>

</xml_diff>